<commit_message>
prepare for thesis def
</commit_message>
<xml_diff>
--- a/Thesis-review.pptx
+++ b/Thesis-review.pptx
@@ -5,7 +5,7 @@
     <p:sldMasterId id="2147483936" r:id="rId1"/>
   </p:sldMasterIdLst>
   <p:notesMasterIdLst>
-    <p:notesMasterId r:id="rId26"/>
+    <p:notesMasterId r:id="rId30"/>
   </p:notesMasterIdLst>
   <p:sldIdLst>
     <p:sldId id="256" r:id="rId2"/>
@@ -32,6 +32,10 @@
     <p:sldId id="282" r:id="rId23"/>
     <p:sldId id="266" r:id="rId24"/>
     <p:sldId id="267" r:id="rId25"/>
+    <p:sldId id="293" r:id="rId26"/>
+    <p:sldId id="294" r:id="rId27"/>
+    <p:sldId id="295" r:id="rId28"/>
+    <p:sldId id="296" r:id="rId29"/>
   </p:sldIdLst>
   <p:sldSz cx="9144000" cy="6858000" type="screen4x3"/>
   <p:notesSz cx="6858000" cy="9144000"/>
@@ -235,7 +239,7 @@
           <a:p>
             <a:fld id="{EEA6C43E-BF2E-4F9E-AD57-441B9F46AF27}" type="datetimeFigureOut">
               <a:rPr lang="en-US" smtClean="0"/>
-              <a:t>4/17/2018</a:t>
+              <a:t>4/18/2018</a:t>
             </a:fld>
             <a:endParaRPr lang="en-US"/>
           </a:p>
@@ -2782,6 +2786,539 @@
 </p:notes>
 </file>
 
+<file path=ppt/notesSlides/notesSlide20.xml><?xml version="1.0" encoding="utf-8"?>
+<p:notes xmlns:a="http://schemas.openxmlformats.org/drawingml/2006/main" xmlns:r="http://schemas.openxmlformats.org/officeDocument/2006/relationships" xmlns:p="http://schemas.openxmlformats.org/presentationml/2006/main">
+  <p:cSld>
+    <p:spTree>
+      <p:nvGrpSpPr>
+        <p:cNvPr id="1" name=""/>
+        <p:cNvGrpSpPr/>
+        <p:nvPr/>
+      </p:nvGrpSpPr>
+      <p:grpSpPr>
+        <a:xfrm>
+          <a:off x="0" y="0"/>
+          <a:ext cx="0" cy="0"/>
+          <a:chOff x="0" y="0"/>
+          <a:chExt cx="0" cy="0"/>
+        </a:xfrm>
+      </p:grpSpPr>
+      <p:sp>
+        <p:nvSpPr>
+          <p:cNvPr id="2" name="Slide Image Placeholder 1"/>
+          <p:cNvSpPr>
+            <a:spLocks noGrp="1" noRot="1" noChangeAspect="1"/>
+          </p:cNvSpPr>
+          <p:nvPr>
+            <p:ph type="sldImg"/>
+          </p:nvPr>
+        </p:nvSpPr>
+        <p:spPr/>
+      </p:sp>
+      <p:sp>
+        <p:nvSpPr>
+          <p:cNvPr id="3" name="Notes Placeholder 2"/>
+          <p:cNvSpPr>
+            <a:spLocks noGrp="1"/>
+          </p:cNvSpPr>
+          <p:nvPr>
+            <p:ph type="body" idx="1"/>
+          </p:nvPr>
+        </p:nvSpPr>
+        <p:spPr/>
+        <p:txBody>
+          <a:bodyPr/>
+          <a:lstStyle/>
+          <a:p>
+            <a:endParaRPr lang="en-US" dirty="0"/>
+          </a:p>
+        </p:txBody>
+      </p:sp>
+      <p:sp>
+        <p:nvSpPr>
+          <p:cNvPr id="4" name="Slide Number Placeholder 3"/>
+          <p:cNvSpPr>
+            <a:spLocks noGrp="1"/>
+          </p:cNvSpPr>
+          <p:nvPr>
+            <p:ph type="sldNum" sz="quarter" idx="10"/>
+          </p:nvPr>
+        </p:nvSpPr>
+        <p:spPr/>
+        <p:txBody>
+          <a:bodyPr/>
+          <a:lstStyle/>
+          <a:p>
+            <a:fld id="{0CACFBBB-5F2D-4F37-867E-042C6B44FB31}" type="slidenum">
+              <a:rPr lang="en-US" smtClean="0"/>
+              <a:t>24</a:t>
+            </a:fld>
+            <a:endParaRPr lang="en-US"/>
+          </a:p>
+        </p:txBody>
+      </p:sp>
+    </p:spTree>
+    <p:extLst>
+      <p:ext uri="{BB962C8B-B14F-4D97-AF65-F5344CB8AC3E}">
+        <p14:creationId xmlns:p14="http://schemas.microsoft.com/office/powerpoint/2010/main" val="4125090244"/>
+      </p:ext>
+    </p:extLst>
+  </p:cSld>
+  <p:clrMapOvr>
+    <a:masterClrMapping/>
+  </p:clrMapOvr>
+</p:notes>
+</file>
+
+<file path=ppt/notesSlides/notesSlide21.xml><?xml version="1.0" encoding="utf-8"?>
+<p:notes xmlns:a="http://schemas.openxmlformats.org/drawingml/2006/main" xmlns:r="http://schemas.openxmlformats.org/officeDocument/2006/relationships" xmlns:p="http://schemas.openxmlformats.org/presentationml/2006/main">
+  <p:cSld>
+    <p:spTree>
+      <p:nvGrpSpPr>
+        <p:cNvPr id="1" name=""/>
+        <p:cNvGrpSpPr/>
+        <p:nvPr/>
+      </p:nvGrpSpPr>
+      <p:grpSpPr>
+        <a:xfrm>
+          <a:off x="0" y="0"/>
+          <a:ext cx="0" cy="0"/>
+          <a:chOff x="0" y="0"/>
+          <a:chExt cx="0" cy="0"/>
+        </a:xfrm>
+      </p:grpSpPr>
+      <p:sp>
+        <p:nvSpPr>
+          <p:cNvPr id="2" name="Slide Image Placeholder 1"/>
+          <p:cNvSpPr>
+            <a:spLocks noGrp="1" noRot="1" noChangeAspect="1"/>
+          </p:cNvSpPr>
+          <p:nvPr>
+            <p:ph type="sldImg"/>
+          </p:nvPr>
+        </p:nvSpPr>
+        <p:spPr/>
+      </p:sp>
+      <p:sp>
+        <p:nvSpPr>
+          <p:cNvPr id="3" name="Notes Placeholder 2"/>
+          <p:cNvSpPr>
+            <a:spLocks noGrp="1"/>
+          </p:cNvSpPr>
+          <p:nvPr>
+            <p:ph type="body" idx="1"/>
+          </p:nvPr>
+        </p:nvSpPr>
+        <p:spPr/>
+        <p:txBody>
+          <a:bodyPr/>
+          <a:lstStyle/>
+          <a:p>
+            <a:r>
+              <a:rPr lang="en-US" dirty="0"/>
+              <a:t>I also have deployed successfully on Heroku server for testing online function</a:t>
+            </a:r>
+          </a:p>
+          <a:p>
+            <a:r>
+              <a:rPr lang="en-US" dirty="0"/>
+              <a:t>Here is the list of my server </a:t>
+            </a:r>
+          </a:p>
+          <a:p>
+            <a:r>
+              <a:rPr lang="en-US" dirty="0"/>
+              <a:t>In your free time, you can go to these links to visit my hotel booking and reservations system </a:t>
+            </a:r>
+          </a:p>
+        </p:txBody>
+      </p:sp>
+      <p:sp>
+        <p:nvSpPr>
+          <p:cNvPr id="4" name="Slide Number Placeholder 3"/>
+          <p:cNvSpPr>
+            <a:spLocks noGrp="1"/>
+          </p:cNvSpPr>
+          <p:nvPr>
+            <p:ph type="sldNum" sz="quarter" idx="10"/>
+          </p:nvPr>
+        </p:nvSpPr>
+        <p:spPr/>
+        <p:txBody>
+          <a:bodyPr/>
+          <a:lstStyle/>
+          <a:p>
+            <a:fld id="{0CACFBBB-5F2D-4F37-867E-042C6B44FB31}" type="slidenum">
+              <a:rPr lang="en-US" smtClean="0"/>
+              <a:t>25</a:t>
+            </a:fld>
+            <a:endParaRPr lang="en-US"/>
+          </a:p>
+        </p:txBody>
+      </p:sp>
+    </p:spTree>
+    <p:extLst>
+      <p:ext uri="{BB962C8B-B14F-4D97-AF65-F5344CB8AC3E}">
+        <p14:creationId xmlns:p14="http://schemas.microsoft.com/office/powerpoint/2010/main" val="1483050353"/>
+      </p:ext>
+    </p:extLst>
+  </p:cSld>
+  <p:clrMapOvr>
+    <a:masterClrMapping/>
+  </p:clrMapOvr>
+</p:notes>
+</file>
+
+<file path=ppt/notesSlides/notesSlide22.xml><?xml version="1.0" encoding="utf-8"?>
+<p:notes xmlns:a="http://schemas.openxmlformats.org/drawingml/2006/main" xmlns:r="http://schemas.openxmlformats.org/officeDocument/2006/relationships" xmlns:p="http://schemas.openxmlformats.org/presentationml/2006/main">
+  <p:cSld>
+    <p:spTree>
+      <p:nvGrpSpPr>
+        <p:cNvPr id="1" name=""/>
+        <p:cNvGrpSpPr/>
+        <p:nvPr/>
+      </p:nvGrpSpPr>
+      <p:grpSpPr>
+        <a:xfrm>
+          <a:off x="0" y="0"/>
+          <a:ext cx="0" cy="0"/>
+          <a:chOff x="0" y="0"/>
+          <a:chExt cx="0" cy="0"/>
+        </a:xfrm>
+      </p:grpSpPr>
+      <p:sp>
+        <p:nvSpPr>
+          <p:cNvPr id="2" name="Slide Image Placeholder 1"/>
+          <p:cNvSpPr>
+            <a:spLocks noGrp="1" noRot="1" noChangeAspect="1"/>
+          </p:cNvSpPr>
+          <p:nvPr>
+            <p:ph type="sldImg"/>
+          </p:nvPr>
+        </p:nvSpPr>
+        <p:spPr/>
+      </p:sp>
+      <p:sp>
+        <p:nvSpPr>
+          <p:cNvPr id="3" name="Notes Placeholder 2"/>
+          <p:cNvSpPr>
+            <a:spLocks noGrp="1"/>
+          </p:cNvSpPr>
+          <p:nvPr>
+            <p:ph type="body" idx="1"/>
+          </p:nvPr>
+        </p:nvSpPr>
+        <p:spPr/>
+        <p:txBody>
+          <a:bodyPr/>
+          <a:lstStyle/>
+          <a:p>
+            <a:endParaRPr lang="en-US" dirty="0"/>
+          </a:p>
+        </p:txBody>
+      </p:sp>
+      <p:sp>
+        <p:nvSpPr>
+          <p:cNvPr id="4" name="Slide Number Placeholder 3"/>
+          <p:cNvSpPr>
+            <a:spLocks noGrp="1"/>
+          </p:cNvSpPr>
+          <p:nvPr>
+            <p:ph type="sldNum" sz="quarter" idx="10"/>
+          </p:nvPr>
+        </p:nvSpPr>
+        <p:spPr/>
+        <p:txBody>
+          <a:bodyPr/>
+          <a:lstStyle/>
+          <a:p>
+            <a:fld id="{0CACFBBB-5F2D-4F37-867E-042C6B44FB31}" type="slidenum">
+              <a:rPr lang="en-US" smtClean="0"/>
+              <a:t>26</a:t>
+            </a:fld>
+            <a:endParaRPr lang="en-US"/>
+          </a:p>
+        </p:txBody>
+      </p:sp>
+    </p:spTree>
+    <p:extLst>
+      <p:ext uri="{BB962C8B-B14F-4D97-AF65-F5344CB8AC3E}">
+        <p14:creationId xmlns:p14="http://schemas.microsoft.com/office/powerpoint/2010/main" val="1740628047"/>
+      </p:ext>
+    </p:extLst>
+  </p:cSld>
+  <p:clrMapOvr>
+    <a:masterClrMapping/>
+  </p:clrMapOvr>
+</p:notes>
+</file>
+
+<file path=ppt/notesSlides/notesSlide23.xml><?xml version="1.0" encoding="utf-8"?>
+<p:notes xmlns:a="http://schemas.openxmlformats.org/drawingml/2006/main" xmlns:r="http://schemas.openxmlformats.org/officeDocument/2006/relationships" xmlns:p="http://schemas.openxmlformats.org/presentationml/2006/main">
+  <p:cSld>
+    <p:spTree>
+      <p:nvGrpSpPr>
+        <p:cNvPr id="1" name=""/>
+        <p:cNvGrpSpPr/>
+        <p:nvPr/>
+      </p:nvGrpSpPr>
+      <p:grpSpPr>
+        <a:xfrm>
+          <a:off x="0" y="0"/>
+          <a:ext cx="0" cy="0"/>
+          <a:chOff x="0" y="0"/>
+          <a:chExt cx="0" cy="0"/>
+        </a:xfrm>
+      </p:grpSpPr>
+      <p:sp>
+        <p:nvSpPr>
+          <p:cNvPr id="2" name="Slide Image Placeholder 1"/>
+          <p:cNvSpPr>
+            <a:spLocks noGrp="1" noRot="1" noChangeAspect="1"/>
+          </p:cNvSpPr>
+          <p:nvPr>
+            <p:ph type="sldImg"/>
+          </p:nvPr>
+        </p:nvSpPr>
+        <p:spPr/>
+      </p:sp>
+      <p:sp>
+        <p:nvSpPr>
+          <p:cNvPr id="3" name="Notes Placeholder 2"/>
+          <p:cNvSpPr>
+            <a:spLocks noGrp="1"/>
+          </p:cNvSpPr>
+          <p:nvPr>
+            <p:ph type="body" idx="1"/>
+          </p:nvPr>
+        </p:nvSpPr>
+        <p:spPr/>
+        <p:txBody>
+          <a:bodyPr/>
+          <a:lstStyle/>
+          <a:p>
+            <a:r>
+              <a:rPr lang="en-US" sz="1200" kern="1200" dirty="0">
+                <a:solidFill>
+                  <a:schemeClr val="tx1"/>
+                </a:solidFill>
+                <a:effectLst/>
+                <a:latin typeface="+mn-lt"/>
+                <a:ea typeface="+mn-ea"/>
+                <a:cs typeface="+mn-cs"/>
+              </a:rPr>
+              <a:t>Hotel business is a highly profitable industry but requires huge investment as well as having to meet the customer's demand. However, managing the hotels is not easy, Therefore, hotel management system is really important. The key of hotel business is service which means pleasure the customers. The best management system will bring the highest profit but there are many factors and difficulty to build a good management system.</a:t>
+            </a:r>
+          </a:p>
+          <a:p>
+            <a:r>
+              <a:rPr lang="en-US" sz="1200" kern="1200" dirty="0">
+                <a:solidFill>
+                  <a:schemeClr val="tx1"/>
+                </a:solidFill>
+                <a:effectLst/>
+                <a:latin typeface="+mn-lt"/>
+                <a:ea typeface="+mn-ea"/>
+                <a:cs typeface="+mn-cs"/>
+              </a:rPr>
+              <a:t> </a:t>
+            </a:r>
+          </a:p>
+          <a:p>
+            <a:r>
+              <a:rPr lang="en-US" sz="1200" kern="1200" dirty="0">
+                <a:solidFill>
+                  <a:schemeClr val="tx1"/>
+                </a:solidFill>
+                <a:effectLst/>
+                <a:latin typeface="+mn-lt"/>
+                <a:ea typeface="+mn-ea"/>
+                <a:cs typeface="+mn-cs"/>
+              </a:rPr>
+              <a:t>After applied MEAN stack and Spring MVC to implements Hotel Booking system, I recognize that my system has friendly user interface, high performance with dynamically loading. Moreover, with tracking customer’s behavior feature, you can easily know what customers like and what they don’t in order to improve system day by day to match the customer ‘s wish.</a:t>
+            </a:r>
+          </a:p>
+          <a:p>
+            <a:r>
+              <a:rPr lang="en-US" sz="1200" kern="1200" dirty="0">
+                <a:solidFill>
+                  <a:schemeClr val="tx1"/>
+                </a:solidFill>
+                <a:effectLst/>
+                <a:latin typeface="+mn-lt"/>
+                <a:ea typeface="+mn-ea"/>
+                <a:cs typeface="+mn-cs"/>
+              </a:rPr>
+              <a:t> </a:t>
+            </a:r>
+          </a:p>
+          <a:p>
+            <a:r>
+              <a:rPr lang="en-US" sz="1200" kern="1200" dirty="0">
+                <a:solidFill>
+                  <a:schemeClr val="tx1"/>
+                </a:solidFill>
+                <a:effectLst/>
+                <a:latin typeface="+mn-lt"/>
+                <a:ea typeface="+mn-ea"/>
+                <a:cs typeface="+mn-cs"/>
+              </a:rPr>
+              <a:t>In the future, I will add more features as well as apply machine learning when I have enough data collection.</a:t>
+            </a:r>
+          </a:p>
+          <a:p>
+            <a:r>
+              <a:rPr lang="en-US" sz="1200" kern="1200" dirty="0">
+                <a:solidFill>
+                  <a:schemeClr val="tx1"/>
+                </a:solidFill>
+                <a:effectLst/>
+                <a:latin typeface="+mn-lt"/>
+                <a:ea typeface="+mn-ea"/>
+                <a:cs typeface="+mn-cs"/>
+              </a:rPr>
+              <a:t> </a:t>
+            </a:r>
+          </a:p>
+          <a:p>
+            <a:r>
+              <a:rPr lang="en-US" sz="1200" kern="1200" dirty="0">
+                <a:solidFill>
+                  <a:schemeClr val="tx1"/>
+                </a:solidFill>
+                <a:effectLst/>
+                <a:latin typeface="+mn-lt"/>
+                <a:ea typeface="+mn-ea"/>
+                <a:cs typeface="+mn-cs"/>
+              </a:rPr>
+              <a:t>After thesis, I have learnt a lot of new things, I learnt a lot of technologies such as AngularJS, Angular 2, MongoDB, Spring MVC, Node.js, Express Framework. I can work with lots of frameworks and I have ability to learn new technology. I also had a lot of experience in building single page application. I will improve myself in the future for working in professional environment.</a:t>
+            </a:r>
+          </a:p>
+          <a:p>
+            <a:endParaRPr lang="en-US" dirty="0"/>
+          </a:p>
+        </p:txBody>
+      </p:sp>
+      <p:sp>
+        <p:nvSpPr>
+          <p:cNvPr id="4" name="Slide Number Placeholder 3"/>
+          <p:cNvSpPr>
+            <a:spLocks noGrp="1"/>
+          </p:cNvSpPr>
+          <p:nvPr>
+            <p:ph type="sldNum" sz="quarter" idx="10"/>
+          </p:nvPr>
+        </p:nvSpPr>
+        <p:spPr/>
+        <p:txBody>
+          <a:bodyPr/>
+          <a:lstStyle/>
+          <a:p>
+            <a:fld id="{0CACFBBB-5F2D-4F37-867E-042C6B44FB31}" type="slidenum">
+              <a:rPr lang="en-US" smtClean="0"/>
+              <a:t>27</a:t>
+            </a:fld>
+            <a:endParaRPr lang="en-US"/>
+          </a:p>
+        </p:txBody>
+      </p:sp>
+    </p:spTree>
+    <p:extLst>
+      <p:ext uri="{BB962C8B-B14F-4D97-AF65-F5344CB8AC3E}">
+        <p14:creationId xmlns:p14="http://schemas.microsoft.com/office/powerpoint/2010/main" val="922826874"/>
+      </p:ext>
+    </p:extLst>
+  </p:cSld>
+  <p:clrMapOvr>
+    <a:masterClrMapping/>
+  </p:clrMapOvr>
+</p:notes>
+</file>
+
+<file path=ppt/notesSlides/notesSlide24.xml><?xml version="1.0" encoding="utf-8"?>
+<p:notes xmlns:a="http://schemas.openxmlformats.org/drawingml/2006/main" xmlns:r="http://schemas.openxmlformats.org/officeDocument/2006/relationships" xmlns:p="http://schemas.openxmlformats.org/presentationml/2006/main">
+  <p:cSld>
+    <p:spTree>
+      <p:nvGrpSpPr>
+        <p:cNvPr id="1" name=""/>
+        <p:cNvGrpSpPr/>
+        <p:nvPr/>
+      </p:nvGrpSpPr>
+      <p:grpSpPr>
+        <a:xfrm>
+          <a:off x="0" y="0"/>
+          <a:ext cx="0" cy="0"/>
+          <a:chOff x="0" y="0"/>
+          <a:chExt cx="0" cy="0"/>
+        </a:xfrm>
+      </p:grpSpPr>
+      <p:sp>
+        <p:nvSpPr>
+          <p:cNvPr id="2" name="Slide Image Placeholder 1"/>
+          <p:cNvSpPr>
+            <a:spLocks noGrp="1" noRot="1" noChangeAspect="1"/>
+          </p:cNvSpPr>
+          <p:nvPr>
+            <p:ph type="sldImg"/>
+          </p:nvPr>
+        </p:nvSpPr>
+        <p:spPr/>
+      </p:sp>
+      <p:sp>
+        <p:nvSpPr>
+          <p:cNvPr id="3" name="Notes Placeholder 2"/>
+          <p:cNvSpPr>
+            <a:spLocks noGrp="1"/>
+          </p:cNvSpPr>
+          <p:nvPr>
+            <p:ph type="body" idx="1"/>
+          </p:nvPr>
+        </p:nvSpPr>
+        <p:spPr/>
+        <p:txBody>
+          <a:bodyPr/>
+          <a:lstStyle/>
+          <a:p>
+            <a:endParaRPr lang="en-US" dirty="0"/>
+          </a:p>
+        </p:txBody>
+      </p:sp>
+      <p:sp>
+        <p:nvSpPr>
+          <p:cNvPr id="4" name="Slide Number Placeholder 3"/>
+          <p:cNvSpPr>
+            <a:spLocks noGrp="1"/>
+          </p:cNvSpPr>
+          <p:nvPr>
+            <p:ph type="sldNum" sz="quarter" idx="10"/>
+          </p:nvPr>
+        </p:nvSpPr>
+        <p:spPr/>
+        <p:txBody>
+          <a:bodyPr/>
+          <a:lstStyle/>
+          <a:p>
+            <a:fld id="{0CACFBBB-5F2D-4F37-867E-042C6B44FB31}" type="slidenum">
+              <a:rPr lang="en-US" smtClean="0"/>
+              <a:t>28</a:t>
+            </a:fld>
+            <a:endParaRPr lang="en-US"/>
+          </a:p>
+        </p:txBody>
+      </p:sp>
+    </p:spTree>
+    <p:extLst>
+      <p:ext uri="{BB962C8B-B14F-4D97-AF65-F5344CB8AC3E}">
+        <p14:creationId xmlns:p14="http://schemas.microsoft.com/office/powerpoint/2010/main" val="1677264068"/>
+      </p:ext>
+    </p:extLst>
+  </p:cSld>
+  <p:clrMapOvr>
+    <a:masterClrMapping/>
+  </p:clrMapOvr>
+</p:notes>
+</file>
+
 <file path=ppt/notesSlides/notesSlide3.xml><?xml version="1.0" encoding="utf-8"?>
 <p:notes xmlns:a="http://schemas.openxmlformats.org/drawingml/2006/main" xmlns:r="http://schemas.openxmlformats.org/officeDocument/2006/relationships" xmlns:p="http://schemas.openxmlformats.org/presentationml/2006/main">
   <p:cSld>
@@ -5063,7 +5600,7 @@
             <a:fld id="{1D8BD707-D9CF-40AE-B4C6-C98DA3205C09}" type="datetimeFigureOut">
               <a:rPr lang="en-US" smtClean="0"/>
               <a:pPr/>
-              <a:t>4/17/2018</a:t>
+              <a:t>4/18/2018</a:t>
             </a:fld>
             <a:endParaRPr lang="en-US"/>
           </a:p>
@@ -5363,7 +5900,7 @@
             <a:fld id="{1D8BD707-D9CF-40AE-B4C6-C98DA3205C09}" type="datetimeFigureOut">
               <a:rPr lang="en-US" smtClean="0"/>
               <a:pPr/>
-              <a:t>4/17/2018</a:t>
+              <a:t>4/18/2018</a:t>
             </a:fld>
             <a:endParaRPr lang="en-US"/>
           </a:p>
@@ -5539,7 +6076,7 @@
             <a:fld id="{1D8BD707-D9CF-40AE-B4C6-C98DA3205C09}" type="datetimeFigureOut">
               <a:rPr lang="en-US" smtClean="0"/>
               <a:pPr/>
-              <a:t>4/17/2018</a:t>
+              <a:t>4/18/2018</a:t>
             </a:fld>
             <a:endParaRPr lang="en-US"/>
           </a:p>
@@ -5705,7 +6242,7 @@
             <a:fld id="{1D8BD707-D9CF-40AE-B4C6-C98DA3205C09}" type="datetimeFigureOut">
               <a:rPr lang="en-US" smtClean="0"/>
               <a:pPr/>
-              <a:t>4/17/2018</a:t>
+              <a:t>4/18/2018</a:t>
             </a:fld>
             <a:endParaRPr lang="en-US"/>
           </a:p>
@@ -5966,7 +6503,7 @@
             <a:fld id="{1D8BD707-D9CF-40AE-B4C6-C98DA3205C09}" type="datetimeFigureOut">
               <a:rPr lang="en-US" smtClean="0"/>
               <a:pPr/>
-              <a:t>4/17/2018</a:t>
+              <a:t>4/18/2018</a:t>
             </a:fld>
             <a:endParaRPr lang="en-US"/>
           </a:p>
@@ -6421,7 +6958,7 @@
             <a:fld id="{1D8BD707-D9CF-40AE-B4C6-C98DA3205C09}" type="datetimeFigureOut">
               <a:rPr lang="en-US" smtClean="0"/>
               <a:pPr/>
-              <a:t>4/17/2018</a:t>
+              <a:t>4/18/2018</a:t>
             </a:fld>
             <a:endParaRPr lang="en-US"/>
           </a:p>
@@ -6905,7 +7442,7 @@
             <a:fld id="{1D8BD707-D9CF-40AE-B4C6-C98DA3205C09}" type="datetimeFigureOut">
               <a:rPr lang="en-US" smtClean="0"/>
               <a:pPr/>
-              <a:t>4/17/2018</a:t>
+              <a:t>4/18/2018</a:t>
             </a:fld>
             <a:endParaRPr lang="en-US"/>
           </a:p>
@@ -7024,7 +7561,7 @@
             <a:fld id="{1D8BD707-D9CF-40AE-B4C6-C98DA3205C09}" type="datetimeFigureOut">
               <a:rPr lang="en-US" smtClean="0"/>
               <a:pPr/>
-              <a:t>4/17/2018</a:t>
+              <a:t>4/18/2018</a:t>
             </a:fld>
             <a:endParaRPr lang="en-US"/>
           </a:p>
@@ -7162,7 +7699,7 @@
             <a:fld id="{1D8BD707-D9CF-40AE-B4C6-C98DA3205C09}" type="datetimeFigureOut">
               <a:rPr lang="en-US" smtClean="0"/>
               <a:pPr/>
-              <a:t>4/17/2018</a:t>
+              <a:t>4/18/2018</a:t>
             </a:fld>
             <a:endParaRPr lang="en-US"/>
           </a:p>
@@ -7477,7 +8014,7 @@
             <a:fld id="{1D8BD707-D9CF-40AE-B4C6-C98DA3205C09}" type="datetimeFigureOut">
               <a:rPr lang="en-US" smtClean="0"/>
               <a:pPr/>
-              <a:t>4/17/2018</a:t>
+              <a:t>4/18/2018</a:t>
             </a:fld>
             <a:endParaRPr lang="en-US"/>
           </a:p>
@@ -7606,7 +8143,7 @@
             <a:fld id="{1D8BD707-D9CF-40AE-B4C6-C98DA3205C09}" type="datetimeFigureOut">
               <a:rPr lang="en-US" smtClean="0"/>
               <a:pPr/>
-              <a:t>4/17/2018</a:t>
+              <a:t>4/18/2018</a:t>
             </a:fld>
             <a:endParaRPr lang="en-US"/>
           </a:p>
@@ -8365,7 +8902,7 @@
             <a:fld id="{1D8BD707-D9CF-40AE-B4C6-C98DA3205C09}" type="datetimeFigureOut">
               <a:rPr lang="en-US" smtClean="0"/>
               <a:pPr/>
-              <a:t>4/17/2018</a:t>
+              <a:t>4/18/2018</a:t>
             </a:fld>
             <a:endParaRPr lang="en-US"/>
           </a:p>
@@ -12893,6 +13430,12 @@
               <a:t>6. Demo</a:t>
             </a:r>
           </a:p>
+          <a:p>
+            <a:r>
+              <a:rPr lang="en-US" dirty="0"/>
+              <a:t>7. Conclusion</a:t>
+            </a:r>
+          </a:p>
         </p:txBody>
       </p:sp>
     </p:spTree>
@@ -13333,6 +13876,1006 @@
     <p:extLst>
       <p:ext uri="{BB962C8B-B14F-4D97-AF65-F5344CB8AC3E}">
         <p14:creationId xmlns:p14="http://schemas.microsoft.com/office/powerpoint/2010/main" val="1109901959"/>
+      </p:ext>
+    </p:extLst>
+  </p:cSld>
+  <p:clrMapOvr>
+    <a:masterClrMapping/>
+  </p:clrMapOvr>
+</p:sld>
+</file>
+
+<file path=ppt/slides/slide25.xml><?xml version="1.0" encoding="utf-8"?>
+<p:sld xmlns:a="http://schemas.openxmlformats.org/drawingml/2006/main" xmlns:r="http://schemas.openxmlformats.org/officeDocument/2006/relationships" xmlns:p="http://schemas.openxmlformats.org/presentationml/2006/main">
+  <p:cSld>
+    <p:spTree>
+      <p:nvGrpSpPr>
+        <p:cNvPr id="1" name=""/>
+        <p:cNvGrpSpPr/>
+        <p:nvPr/>
+      </p:nvGrpSpPr>
+      <p:grpSpPr>
+        <a:xfrm>
+          <a:off x="0" y="0"/>
+          <a:ext cx="0" cy="0"/>
+          <a:chOff x="0" y="0"/>
+          <a:chExt cx="0" cy="0"/>
+        </a:xfrm>
+      </p:grpSpPr>
+      <p:sp>
+        <p:nvSpPr>
+          <p:cNvPr id="4" name="Title 1">
+            <a:extLst>
+              <a:ext uri="{FF2B5EF4-FFF2-40B4-BE49-F238E27FC236}">
+                <a16:creationId xmlns:a16="http://schemas.microsoft.com/office/drawing/2014/main" id="{E7F0D2D4-DACD-4ECB-96E0-5817266BD6F2}"/>
+              </a:ext>
+            </a:extLst>
+          </p:cNvPr>
+          <p:cNvSpPr>
+            <a:spLocks noGrp="1"/>
+          </p:cNvSpPr>
+          <p:nvPr>
+            <p:ph type="title"/>
+          </p:nvPr>
+        </p:nvSpPr>
+        <p:spPr>
+          <a:xfrm>
+            <a:off x="1371600" y="228600"/>
+            <a:ext cx="7498080" cy="1143000"/>
+          </a:xfrm>
+        </p:spPr>
+        <p:txBody>
+          <a:bodyPr/>
+          <a:lstStyle/>
+          <a:p>
+            <a:r>
+              <a:rPr lang="en-US" dirty="0"/>
+              <a:t>Online Demo</a:t>
+            </a:r>
+          </a:p>
+        </p:txBody>
+      </p:sp>
+      <p:sp>
+        <p:nvSpPr>
+          <p:cNvPr id="5" name="Rectangle 4">
+            <a:extLst>
+              <a:ext uri="{FF2B5EF4-FFF2-40B4-BE49-F238E27FC236}">
+                <a16:creationId xmlns:a16="http://schemas.microsoft.com/office/drawing/2014/main" id="{FED5E14A-C0D6-4FFF-88C0-9B024508D0BB}"/>
+              </a:ext>
+            </a:extLst>
+          </p:cNvPr>
+          <p:cNvSpPr/>
+          <p:nvPr/>
+        </p:nvSpPr>
+        <p:spPr>
+          <a:xfrm>
+            <a:off x="1447800" y="1371600"/>
+            <a:ext cx="4303935" cy="369332"/>
+          </a:xfrm>
+          <a:prstGeom prst="rect">
+            <a:avLst/>
+          </a:prstGeom>
+        </p:spPr>
+        <p:txBody>
+          <a:bodyPr wrap="none">
+            <a:spAutoFit/>
+          </a:bodyPr>
+          <a:lstStyle/>
+          <a:p>
+            <a:r>
+              <a:rPr lang="en-US" dirty="0">
+                <a:hlinkClick r:id="rId3"/>
+              </a:rPr>
+              <a:t>http://admin-hotel-booking.herokuapp.com/</a:t>
+            </a:r>
+            <a:r>
+              <a:rPr lang="en-US" dirty="0"/>
+              <a:t> </a:t>
+            </a:r>
+          </a:p>
+        </p:txBody>
+      </p:sp>
+      <p:sp>
+        <p:nvSpPr>
+          <p:cNvPr id="6" name="Rectangle 5">
+            <a:extLst>
+              <a:ext uri="{FF2B5EF4-FFF2-40B4-BE49-F238E27FC236}">
+                <a16:creationId xmlns:a16="http://schemas.microsoft.com/office/drawing/2014/main" id="{692BBF62-28B1-4AE3-B032-A1B70A777809}"/>
+              </a:ext>
+            </a:extLst>
+          </p:cNvPr>
+          <p:cNvSpPr/>
+          <p:nvPr/>
+        </p:nvSpPr>
+        <p:spPr>
+          <a:xfrm>
+            <a:off x="1428011" y="1981200"/>
+            <a:ext cx="4595682" cy="369332"/>
+          </a:xfrm>
+          <a:prstGeom prst="rect">
+            <a:avLst/>
+          </a:prstGeom>
+        </p:spPr>
+        <p:txBody>
+          <a:bodyPr wrap="none">
+            <a:spAutoFit/>
+          </a:bodyPr>
+          <a:lstStyle/>
+          <a:p>
+            <a:r>
+              <a:rPr lang="en-US" dirty="0">
+                <a:hlinkClick r:id="rId4"/>
+              </a:rPr>
+              <a:t>http://admin-hotel-booking-v1.herokuapp.com/</a:t>
+            </a:r>
+            <a:r>
+              <a:rPr lang="en-US" dirty="0"/>
+              <a:t> </a:t>
+            </a:r>
+          </a:p>
+        </p:txBody>
+      </p:sp>
+      <p:sp>
+        <p:nvSpPr>
+          <p:cNvPr id="7" name="Rectangle 6">
+            <a:extLst>
+              <a:ext uri="{FF2B5EF4-FFF2-40B4-BE49-F238E27FC236}">
+                <a16:creationId xmlns:a16="http://schemas.microsoft.com/office/drawing/2014/main" id="{069C755C-03FB-4BE0-9DAA-D29A3719AAA6}"/>
+              </a:ext>
+            </a:extLst>
+          </p:cNvPr>
+          <p:cNvSpPr/>
+          <p:nvPr/>
+        </p:nvSpPr>
+        <p:spPr>
+          <a:xfrm>
+            <a:off x="1447800" y="2612136"/>
+            <a:ext cx="4679038" cy="369332"/>
+          </a:xfrm>
+          <a:prstGeom prst="rect">
+            <a:avLst/>
+          </a:prstGeom>
+        </p:spPr>
+        <p:txBody>
+          <a:bodyPr wrap="none">
+            <a:spAutoFit/>
+          </a:bodyPr>
+          <a:lstStyle/>
+          <a:p>
+            <a:r>
+              <a:rPr lang="en-US" dirty="0">
+                <a:hlinkClick r:id="rId5"/>
+              </a:rPr>
+              <a:t>http://hotel-booking-system-v1.herokuapp.com/</a:t>
+            </a:r>
+            <a:r>
+              <a:rPr lang="en-US" dirty="0"/>
+              <a:t> </a:t>
+            </a:r>
+          </a:p>
+        </p:txBody>
+      </p:sp>
+      <p:sp>
+        <p:nvSpPr>
+          <p:cNvPr id="8" name="Rectangle 7">
+            <a:extLst>
+              <a:ext uri="{FF2B5EF4-FFF2-40B4-BE49-F238E27FC236}">
+                <a16:creationId xmlns:a16="http://schemas.microsoft.com/office/drawing/2014/main" id="{794C1D09-8EB5-4023-9D11-5DDA6DC1E5E5}"/>
+              </a:ext>
+            </a:extLst>
+          </p:cNvPr>
+          <p:cNvSpPr/>
+          <p:nvPr/>
+        </p:nvSpPr>
+        <p:spPr>
+          <a:xfrm>
+            <a:off x="1458491" y="3243072"/>
+            <a:ext cx="4679038" cy="369332"/>
+          </a:xfrm>
+          <a:prstGeom prst="rect">
+            <a:avLst/>
+          </a:prstGeom>
+        </p:spPr>
+        <p:txBody>
+          <a:bodyPr wrap="none">
+            <a:spAutoFit/>
+          </a:bodyPr>
+          <a:lstStyle/>
+          <a:p>
+            <a:r>
+              <a:rPr lang="en-US" dirty="0">
+                <a:hlinkClick r:id="rId6"/>
+              </a:rPr>
+              <a:t>http://hotel-booking-system-v2.herokuapp.com/</a:t>
+            </a:r>
+            <a:r>
+              <a:rPr lang="en-US" dirty="0"/>
+              <a:t> </a:t>
+            </a:r>
+          </a:p>
+        </p:txBody>
+      </p:sp>
+      <p:sp>
+        <p:nvSpPr>
+          <p:cNvPr id="9" name="Rectangle 8">
+            <a:extLst>
+              <a:ext uri="{FF2B5EF4-FFF2-40B4-BE49-F238E27FC236}">
+                <a16:creationId xmlns:a16="http://schemas.microsoft.com/office/drawing/2014/main" id="{24C7ED4B-FD10-43A9-8B7D-5E65BF356BA7}"/>
+              </a:ext>
+            </a:extLst>
+          </p:cNvPr>
+          <p:cNvSpPr/>
+          <p:nvPr/>
+        </p:nvSpPr>
+        <p:spPr>
+          <a:xfrm>
+            <a:off x="1412771" y="3874008"/>
+            <a:ext cx="6042391" cy="369332"/>
+          </a:xfrm>
+          <a:prstGeom prst="rect">
+            <a:avLst/>
+          </a:prstGeom>
+        </p:spPr>
+        <p:txBody>
+          <a:bodyPr wrap="square">
+            <a:spAutoFit/>
+          </a:bodyPr>
+          <a:lstStyle/>
+          <a:p>
+            <a:r>
+              <a:rPr lang="en-US" dirty="0">
+                <a:solidFill>
+                  <a:srgbClr val="032F62"/>
+                </a:solidFill>
+                <a:latin typeface="SFMono-Regular"/>
+                <a:hlinkClick r:id="rId7"/>
+              </a:rPr>
+              <a:t>https://hotel-booking-and-reservations.herokuapp.com/</a:t>
+            </a:r>
+            <a:r>
+              <a:rPr lang="en-US" dirty="0">
+                <a:solidFill>
+                  <a:srgbClr val="032F62"/>
+                </a:solidFill>
+                <a:latin typeface="SFMono-Regular"/>
+              </a:rPr>
+              <a:t> </a:t>
+            </a:r>
+            <a:endParaRPr lang="en-US" dirty="0"/>
+          </a:p>
+        </p:txBody>
+      </p:sp>
+    </p:spTree>
+    <p:extLst>
+      <p:ext uri="{BB962C8B-B14F-4D97-AF65-F5344CB8AC3E}">
+        <p14:creationId xmlns:p14="http://schemas.microsoft.com/office/powerpoint/2010/main" val="352348129"/>
+      </p:ext>
+    </p:extLst>
+  </p:cSld>
+  <p:clrMapOvr>
+    <a:masterClrMapping/>
+  </p:clrMapOvr>
+</p:sld>
+</file>
+
+<file path=ppt/slides/slide26.xml><?xml version="1.0" encoding="utf-8"?>
+<p:sld xmlns:a="http://schemas.openxmlformats.org/drawingml/2006/main" xmlns:r="http://schemas.openxmlformats.org/officeDocument/2006/relationships" xmlns:p="http://schemas.openxmlformats.org/presentationml/2006/main">
+  <p:cSld>
+    <p:spTree>
+      <p:nvGrpSpPr>
+        <p:cNvPr id="1" name=""/>
+        <p:cNvGrpSpPr/>
+        <p:nvPr/>
+      </p:nvGrpSpPr>
+      <p:grpSpPr>
+        <a:xfrm>
+          <a:off x="0" y="0"/>
+          <a:ext cx="0" cy="0"/>
+          <a:chOff x="0" y="0"/>
+          <a:chExt cx="0" cy="0"/>
+        </a:xfrm>
+      </p:grpSpPr>
+      <p:sp>
+        <p:nvSpPr>
+          <p:cNvPr id="6" name="Title 1">
+            <a:extLst>
+              <a:ext uri="{FF2B5EF4-FFF2-40B4-BE49-F238E27FC236}">
+                <a16:creationId xmlns:a16="http://schemas.microsoft.com/office/drawing/2014/main" id="{7772A556-4A73-404A-B6A4-9E7267F9EFF9}"/>
+              </a:ext>
+            </a:extLst>
+          </p:cNvPr>
+          <p:cNvSpPr>
+            <a:spLocks noGrp="1"/>
+          </p:cNvSpPr>
+          <p:nvPr>
+            <p:ph type="title"/>
+          </p:nvPr>
+        </p:nvSpPr>
+        <p:spPr>
+          <a:xfrm>
+            <a:off x="3124200" y="2743200"/>
+            <a:ext cx="3810000" cy="1143000"/>
+          </a:xfrm>
+        </p:spPr>
+        <p:txBody>
+          <a:bodyPr>
+            <a:normAutofit fontScale="90000"/>
+          </a:bodyPr>
+          <a:lstStyle/>
+          <a:p>
+            <a:r>
+              <a:rPr lang="en-US" sz="4400" b="1" dirty="0">
+                <a:effectLst/>
+                <a:latin typeface="Times New Roman" pitchFamily="18" charset="0"/>
+                <a:cs typeface="Times New Roman" pitchFamily="18" charset="0"/>
+              </a:rPr>
+              <a:t>VII. Conclusion</a:t>
+            </a:r>
+          </a:p>
+        </p:txBody>
+      </p:sp>
+    </p:spTree>
+    <p:extLst>
+      <p:ext uri="{BB962C8B-B14F-4D97-AF65-F5344CB8AC3E}">
+        <p14:creationId xmlns:p14="http://schemas.microsoft.com/office/powerpoint/2010/main" val="62896195"/>
+      </p:ext>
+    </p:extLst>
+  </p:cSld>
+  <p:clrMapOvr>
+    <a:masterClrMapping/>
+  </p:clrMapOvr>
+</p:sld>
+</file>
+
+<file path=ppt/slides/slide27.xml><?xml version="1.0" encoding="utf-8"?>
+<p:sld xmlns:a="http://schemas.openxmlformats.org/drawingml/2006/main" xmlns:r="http://schemas.openxmlformats.org/officeDocument/2006/relationships" xmlns:p="http://schemas.openxmlformats.org/presentationml/2006/main">
+  <p:cSld>
+    <p:spTree>
+      <p:nvGrpSpPr>
+        <p:cNvPr id="1" name=""/>
+        <p:cNvGrpSpPr/>
+        <p:nvPr/>
+      </p:nvGrpSpPr>
+      <p:grpSpPr>
+        <a:xfrm>
+          <a:off x="0" y="0"/>
+          <a:ext cx="0" cy="0"/>
+          <a:chOff x="0" y="0"/>
+          <a:chExt cx="0" cy="0"/>
+        </a:xfrm>
+      </p:grpSpPr>
+      <p:sp>
+        <p:nvSpPr>
+          <p:cNvPr id="4" name="Rectangle 3">
+            <a:extLst>
+              <a:ext uri="{FF2B5EF4-FFF2-40B4-BE49-F238E27FC236}">
+                <a16:creationId xmlns:a16="http://schemas.microsoft.com/office/drawing/2014/main" id="{BA103DB3-3F1D-4135-848F-E8163CE20963}"/>
+              </a:ext>
+            </a:extLst>
+          </p:cNvPr>
+          <p:cNvSpPr/>
+          <p:nvPr/>
+        </p:nvSpPr>
+        <p:spPr>
+          <a:xfrm>
+            <a:off x="1371600" y="1981200"/>
+            <a:ext cx="7010400" cy="2031325"/>
+          </a:xfrm>
+          <a:prstGeom prst="rect">
+            <a:avLst/>
+          </a:prstGeom>
+        </p:spPr>
+        <p:txBody>
+          <a:bodyPr wrap="square">
+            <a:spAutoFit/>
+          </a:bodyPr>
+          <a:lstStyle/>
+          <a:p>
+            <a:endParaRPr lang="en-US" dirty="0"/>
+          </a:p>
+          <a:p>
+            <a:r>
+              <a:rPr lang="en-US" dirty="0"/>
+              <a:t>After thesis</a:t>
+            </a:r>
+          </a:p>
+          <a:p>
+            <a:endParaRPr lang="en-US" dirty="0"/>
+          </a:p>
+          <a:p>
+            <a:pPr marL="285750" indent="-285750">
+              <a:buFontTx/>
+              <a:buChar char="-"/>
+            </a:pPr>
+            <a:r>
+              <a:rPr lang="en-US" dirty="0"/>
+              <a:t>Learn a lot of new technologies</a:t>
+            </a:r>
+          </a:p>
+          <a:p>
+            <a:endParaRPr lang="en-US" dirty="0"/>
+          </a:p>
+          <a:p>
+            <a:pPr marL="285750" indent="-285750">
+              <a:buFontTx/>
+              <a:buChar char="-"/>
+            </a:pPr>
+            <a:r>
+              <a:rPr lang="en-US" dirty="0"/>
+              <a:t>Experience in building a complex application</a:t>
+            </a:r>
+          </a:p>
+          <a:p>
+            <a:pPr marL="285750" indent="-285750">
+              <a:buFontTx/>
+              <a:buChar char="-"/>
+            </a:pPr>
+            <a:endParaRPr lang="en-US" dirty="0"/>
+          </a:p>
+        </p:txBody>
+      </p:sp>
+      <p:sp>
+        <p:nvSpPr>
+          <p:cNvPr id="5" name="Title 1">
+            <a:extLst>
+              <a:ext uri="{FF2B5EF4-FFF2-40B4-BE49-F238E27FC236}">
+                <a16:creationId xmlns:a16="http://schemas.microsoft.com/office/drawing/2014/main" id="{236D77EC-534B-4E4C-A5AC-531B082B2186}"/>
+              </a:ext>
+            </a:extLst>
+          </p:cNvPr>
+          <p:cNvSpPr>
+            <a:spLocks noGrp="1"/>
+          </p:cNvSpPr>
+          <p:nvPr>
+            <p:ph type="title"/>
+          </p:nvPr>
+        </p:nvSpPr>
+        <p:spPr>
+          <a:xfrm>
+            <a:off x="1371600" y="228600"/>
+            <a:ext cx="7498080" cy="1143000"/>
+          </a:xfrm>
+        </p:spPr>
+        <p:txBody>
+          <a:bodyPr/>
+          <a:lstStyle/>
+          <a:p>
+            <a:r>
+              <a:rPr lang="en-US" dirty="0"/>
+              <a:t>Conclusion</a:t>
+            </a:r>
+          </a:p>
+        </p:txBody>
+      </p:sp>
+      <p:sp>
+        <p:nvSpPr>
+          <p:cNvPr id="6" name="Rectangle 5">
+            <a:extLst>
+              <a:ext uri="{FF2B5EF4-FFF2-40B4-BE49-F238E27FC236}">
+                <a16:creationId xmlns:a16="http://schemas.microsoft.com/office/drawing/2014/main" id="{DA8C5326-C003-4827-8485-4CCD13BED7A3}"/>
+              </a:ext>
+            </a:extLst>
+          </p:cNvPr>
+          <p:cNvSpPr/>
+          <p:nvPr/>
+        </p:nvSpPr>
+        <p:spPr>
+          <a:xfrm>
+            <a:off x="1371600" y="4267200"/>
+            <a:ext cx="6781800" cy="1200329"/>
+          </a:xfrm>
+          <a:prstGeom prst="rect">
+            <a:avLst/>
+          </a:prstGeom>
+        </p:spPr>
+        <p:txBody>
+          <a:bodyPr wrap="square">
+            <a:spAutoFit/>
+          </a:bodyPr>
+          <a:lstStyle/>
+          <a:p>
+            <a:r>
+              <a:rPr lang="en-US" dirty="0"/>
+              <a:t>In the future</a:t>
+            </a:r>
+          </a:p>
+          <a:p>
+            <a:endParaRPr lang="en-US" dirty="0"/>
+          </a:p>
+          <a:p>
+            <a:pPr marL="285750" indent="-285750">
+              <a:buFontTx/>
+              <a:buChar char="-"/>
+            </a:pPr>
+            <a:r>
+              <a:rPr lang="en-US" dirty="0"/>
+              <a:t>Add more features </a:t>
+            </a:r>
+          </a:p>
+          <a:p>
+            <a:pPr marL="285750" indent="-285750">
+              <a:buFontTx/>
+              <a:buChar char="-"/>
+            </a:pPr>
+            <a:r>
+              <a:rPr lang="en-US" dirty="0"/>
+              <a:t>Apply machine learning when I have enough data collection.</a:t>
+            </a:r>
+          </a:p>
+        </p:txBody>
+      </p:sp>
+    </p:spTree>
+    <p:extLst>
+      <p:ext uri="{BB962C8B-B14F-4D97-AF65-F5344CB8AC3E}">
+        <p14:creationId xmlns:p14="http://schemas.microsoft.com/office/powerpoint/2010/main" val="78439858"/>
+      </p:ext>
+    </p:extLst>
+  </p:cSld>
+  <p:clrMapOvr>
+    <a:masterClrMapping/>
+  </p:clrMapOvr>
+  <p:timing>
+    <p:tnLst>
+      <p:par>
+        <p:cTn id="1" dur="indefinite" restart="never" nodeType="tmRoot">
+          <p:childTnLst>
+            <p:seq concurrent="1" nextAc="seek">
+              <p:cTn id="2" dur="indefinite" nodeType="mainSeq">
+                <p:childTnLst>
+                  <p:par>
+                    <p:cTn id="3" fill="hold">
+                      <p:stCondLst>
+                        <p:cond delay="indefinite"/>
+                      </p:stCondLst>
+                      <p:childTnLst>
+                        <p:par>
+                          <p:cTn id="4" fill="hold">
+                            <p:stCondLst>
+                              <p:cond delay="0"/>
+                            </p:stCondLst>
+                            <p:childTnLst>
+                              <p:par>
+                                <p:cTn id="5" presetID="42" presetClass="entr" presetSubtype="0" fill="hold" nodeType="clickEffect">
+                                  <p:stCondLst>
+                                    <p:cond delay="0"/>
+                                  </p:stCondLst>
+                                  <p:childTnLst>
+                                    <p:set>
+                                      <p:cBhvr>
+                                        <p:cTn id="6" dur="1" fill="hold">
+                                          <p:stCondLst>
+                                            <p:cond delay="0"/>
+                                          </p:stCondLst>
+                                        </p:cTn>
+                                        <p:tgtEl>
+                                          <p:spTgt spid="4">
+                                            <p:txEl>
+                                              <p:pRg st="1" end="1"/>
+                                            </p:txEl>
+                                          </p:spTgt>
+                                        </p:tgtEl>
+                                        <p:attrNameLst>
+                                          <p:attrName>style.visibility</p:attrName>
+                                        </p:attrNameLst>
+                                      </p:cBhvr>
+                                      <p:to>
+                                        <p:strVal val="visible"/>
+                                      </p:to>
+                                    </p:set>
+                                    <p:animEffect transition="in" filter="fade">
+                                      <p:cBhvr>
+                                        <p:cTn id="7" dur="1000"/>
+                                        <p:tgtEl>
+                                          <p:spTgt spid="4">
+                                            <p:txEl>
+                                              <p:pRg st="1" end="1"/>
+                                            </p:txEl>
+                                          </p:spTgt>
+                                        </p:tgtEl>
+                                      </p:cBhvr>
+                                    </p:animEffect>
+                                    <p:anim calcmode="lin" valueType="num">
+                                      <p:cBhvr>
+                                        <p:cTn id="8" dur="1000" fill="hold"/>
+                                        <p:tgtEl>
+                                          <p:spTgt spid="4">
+                                            <p:txEl>
+                                              <p:pRg st="1" end="1"/>
+                                            </p:txEl>
+                                          </p:spTgt>
+                                        </p:tgtEl>
+                                        <p:attrNameLst>
+                                          <p:attrName>ppt_x</p:attrName>
+                                        </p:attrNameLst>
+                                      </p:cBhvr>
+                                      <p:tavLst>
+                                        <p:tav tm="0">
+                                          <p:val>
+                                            <p:strVal val="#ppt_x"/>
+                                          </p:val>
+                                        </p:tav>
+                                        <p:tav tm="100000">
+                                          <p:val>
+                                            <p:strVal val="#ppt_x"/>
+                                          </p:val>
+                                        </p:tav>
+                                      </p:tavLst>
+                                    </p:anim>
+                                    <p:anim calcmode="lin" valueType="num">
+                                      <p:cBhvr>
+                                        <p:cTn id="9" dur="1000" fill="hold"/>
+                                        <p:tgtEl>
+                                          <p:spTgt spid="4">
+                                            <p:txEl>
+                                              <p:pRg st="1" end="1"/>
+                                            </p:txEl>
+                                          </p:spTgt>
+                                        </p:tgtEl>
+                                        <p:attrNameLst>
+                                          <p:attrName>ppt_y</p:attrName>
+                                        </p:attrNameLst>
+                                      </p:cBhvr>
+                                      <p:tavLst>
+                                        <p:tav tm="0">
+                                          <p:val>
+                                            <p:strVal val="#ppt_y+.1"/>
+                                          </p:val>
+                                        </p:tav>
+                                        <p:tav tm="100000">
+                                          <p:val>
+                                            <p:strVal val="#ppt_y"/>
+                                          </p:val>
+                                        </p:tav>
+                                      </p:tavLst>
+                                    </p:anim>
+                                  </p:childTnLst>
+                                </p:cTn>
+                              </p:par>
+                            </p:childTnLst>
+                          </p:cTn>
+                        </p:par>
+                      </p:childTnLst>
+                    </p:cTn>
+                  </p:par>
+                  <p:par>
+                    <p:cTn id="10" fill="hold">
+                      <p:stCondLst>
+                        <p:cond delay="indefinite"/>
+                      </p:stCondLst>
+                      <p:childTnLst>
+                        <p:par>
+                          <p:cTn id="11" fill="hold">
+                            <p:stCondLst>
+                              <p:cond delay="0"/>
+                            </p:stCondLst>
+                            <p:childTnLst>
+                              <p:par>
+                                <p:cTn id="12" presetID="42" presetClass="entr" presetSubtype="0" fill="hold" nodeType="clickEffect">
+                                  <p:stCondLst>
+                                    <p:cond delay="0"/>
+                                  </p:stCondLst>
+                                  <p:childTnLst>
+                                    <p:set>
+                                      <p:cBhvr>
+                                        <p:cTn id="13" dur="1" fill="hold">
+                                          <p:stCondLst>
+                                            <p:cond delay="0"/>
+                                          </p:stCondLst>
+                                        </p:cTn>
+                                        <p:tgtEl>
+                                          <p:spTgt spid="4">
+                                            <p:txEl>
+                                              <p:pRg st="3" end="3"/>
+                                            </p:txEl>
+                                          </p:spTgt>
+                                        </p:tgtEl>
+                                        <p:attrNameLst>
+                                          <p:attrName>style.visibility</p:attrName>
+                                        </p:attrNameLst>
+                                      </p:cBhvr>
+                                      <p:to>
+                                        <p:strVal val="visible"/>
+                                      </p:to>
+                                    </p:set>
+                                    <p:animEffect transition="in" filter="fade">
+                                      <p:cBhvr>
+                                        <p:cTn id="14" dur="1000"/>
+                                        <p:tgtEl>
+                                          <p:spTgt spid="4">
+                                            <p:txEl>
+                                              <p:pRg st="3" end="3"/>
+                                            </p:txEl>
+                                          </p:spTgt>
+                                        </p:tgtEl>
+                                      </p:cBhvr>
+                                    </p:animEffect>
+                                    <p:anim calcmode="lin" valueType="num">
+                                      <p:cBhvr>
+                                        <p:cTn id="15" dur="1000" fill="hold"/>
+                                        <p:tgtEl>
+                                          <p:spTgt spid="4">
+                                            <p:txEl>
+                                              <p:pRg st="3" end="3"/>
+                                            </p:txEl>
+                                          </p:spTgt>
+                                        </p:tgtEl>
+                                        <p:attrNameLst>
+                                          <p:attrName>ppt_x</p:attrName>
+                                        </p:attrNameLst>
+                                      </p:cBhvr>
+                                      <p:tavLst>
+                                        <p:tav tm="0">
+                                          <p:val>
+                                            <p:strVal val="#ppt_x"/>
+                                          </p:val>
+                                        </p:tav>
+                                        <p:tav tm="100000">
+                                          <p:val>
+                                            <p:strVal val="#ppt_x"/>
+                                          </p:val>
+                                        </p:tav>
+                                      </p:tavLst>
+                                    </p:anim>
+                                    <p:anim calcmode="lin" valueType="num">
+                                      <p:cBhvr>
+                                        <p:cTn id="16" dur="1000" fill="hold"/>
+                                        <p:tgtEl>
+                                          <p:spTgt spid="4">
+                                            <p:txEl>
+                                              <p:pRg st="3" end="3"/>
+                                            </p:txEl>
+                                          </p:spTgt>
+                                        </p:tgtEl>
+                                        <p:attrNameLst>
+                                          <p:attrName>ppt_y</p:attrName>
+                                        </p:attrNameLst>
+                                      </p:cBhvr>
+                                      <p:tavLst>
+                                        <p:tav tm="0">
+                                          <p:val>
+                                            <p:strVal val="#ppt_y+.1"/>
+                                          </p:val>
+                                        </p:tav>
+                                        <p:tav tm="100000">
+                                          <p:val>
+                                            <p:strVal val="#ppt_y"/>
+                                          </p:val>
+                                        </p:tav>
+                                      </p:tavLst>
+                                    </p:anim>
+                                  </p:childTnLst>
+                                </p:cTn>
+                              </p:par>
+                            </p:childTnLst>
+                          </p:cTn>
+                        </p:par>
+                      </p:childTnLst>
+                    </p:cTn>
+                  </p:par>
+                  <p:par>
+                    <p:cTn id="17" fill="hold">
+                      <p:stCondLst>
+                        <p:cond delay="indefinite"/>
+                      </p:stCondLst>
+                      <p:childTnLst>
+                        <p:par>
+                          <p:cTn id="18" fill="hold">
+                            <p:stCondLst>
+                              <p:cond delay="0"/>
+                            </p:stCondLst>
+                            <p:childTnLst>
+                              <p:par>
+                                <p:cTn id="19" presetID="42" presetClass="entr" presetSubtype="0" fill="hold" nodeType="clickEffect">
+                                  <p:stCondLst>
+                                    <p:cond delay="0"/>
+                                  </p:stCondLst>
+                                  <p:childTnLst>
+                                    <p:set>
+                                      <p:cBhvr>
+                                        <p:cTn id="20" dur="1" fill="hold">
+                                          <p:stCondLst>
+                                            <p:cond delay="0"/>
+                                          </p:stCondLst>
+                                        </p:cTn>
+                                        <p:tgtEl>
+                                          <p:spTgt spid="4">
+                                            <p:txEl>
+                                              <p:pRg st="5" end="5"/>
+                                            </p:txEl>
+                                          </p:spTgt>
+                                        </p:tgtEl>
+                                        <p:attrNameLst>
+                                          <p:attrName>style.visibility</p:attrName>
+                                        </p:attrNameLst>
+                                      </p:cBhvr>
+                                      <p:to>
+                                        <p:strVal val="visible"/>
+                                      </p:to>
+                                    </p:set>
+                                    <p:animEffect transition="in" filter="fade">
+                                      <p:cBhvr>
+                                        <p:cTn id="21" dur="1000"/>
+                                        <p:tgtEl>
+                                          <p:spTgt spid="4">
+                                            <p:txEl>
+                                              <p:pRg st="5" end="5"/>
+                                            </p:txEl>
+                                          </p:spTgt>
+                                        </p:tgtEl>
+                                      </p:cBhvr>
+                                    </p:animEffect>
+                                    <p:anim calcmode="lin" valueType="num">
+                                      <p:cBhvr>
+                                        <p:cTn id="22" dur="1000" fill="hold"/>
+                                        <p:tgtEl>
+                                          <p:spTgt spid="4">
+                                            <p:txEl>
+                                              <p:pRg st="5" end="5"/>
+                                            </p:txEl>
+                                          </p:spTgt>
+                                        </p:tgtEl>
+                                        <p:attrNameLst>
+                                          <p:attrName>ppt_x</p:attrName>
+                                        </p:attrNameLst>
+                                      </p:cBhvr>
+                                      <p:tavLst>
+                                        <p:tav tm="0">
+                                          <p:val>
+                                            <p:strVal val="#ppt_x"/>
+                                          </p:val>
+                                        </p:tav>
+                                        <p:tav tm="100000">
+                                          <p:val>
+                                            <p:strVal val="#ppt_x"/>
+                                          </p:val>
+                                        </p:tav>
+                                      </p:tavLst>
+                                    </p:anim>
+                                    <p:anim calcmode="lin" valueType="num">
+                                      <p:cBhvr>
+                                        <p:cTn id="23" dur="1000" fill="hold"/>
+                                        <p:tgtEl>
+                                          <p:spTgt spid="4">
+                                            <p:txEl>
+                                              <p:pRg st="5" end="5"/>
+                                            </p:txEl>
+                                          </p:spTgt>
+                                        </p:tgtEl>
+                                        <p:attrNameLst>
+                                          <p:attrName>ppt_y</p:attrName>
+                                        </p:attrNameLst>
+                                      </p:cBhvr>
+                                      <p:tavLst>
+                                        <p:tav tm="0">
+                                          <p:val>
+                                            <p:strVal val="#ppt_y+.1"/>
+                                          </p:val>
+                                        </p:tav>
+                                        <p:tav tm="100000">
+                                          <p:val>
+                                            <p:strVal val="#ppt_y"/>
+                                          </p:val>
+                                        </p:tav>
+                                      </p:tavLst>
+                                    </p:anim>
+                                  </p:childTnLst>
+                                </p:cTn>
+                              </p:par>
+                            </p:childTnLst>
+                          </p:cTn>
+                        </p:par>
+                      </p:childTnLst>
+                    </p:cTn>
+                  </p:par>
+                </p:childTnLst>
+              </p:cTn>
+              <p:prevCondLst>
+                <p:cond evt="onPrev" delay="0">
+                  <p:tgtEl>
+                    <p:sldTgt/>
+                  </p:tgtEl>
+                </p:cond>
+              </p:prevCondLst>
+              <p:nextCondLst>
+                <p:cond evt="onNext" delay="0">
+                  <p:tgtEl>
+                    <p:sldTgt/>
+                  </p:tgtEl>
+                </p:cond>
+              </p:nextCondLst>
+            </p:seq>
+          </p:childTnLst>
+        </p:cTn>
+      </p:par>
+    </p:tnLst>
+  </p:timing>
+</p:sld>
+</file>
+
+<file path=ppt/slides/slide28.xml><?xml version="1.0" encoding="utf-8"?>
+<p:sld xmlns:a="http://schemas.openxmlformats.org/drawingml/2006/main" xmlns:r="http://schemas.openxmlformats.org/officeDocument/2006/relationships" xmlns:p="http://schemas.openxmlformats.org/presentationml/2006/main">
+  <p:cSld>
+    <p:spTree>
+      <p:nvGrpSpPr>
+        <p:cNvPr id="1" name=""/>
+        <p:cNvGrpSpPr/>
+        <p:nvPr/>
+      </p:nvGrpSpPr>
+      <p:grpSpPr>
+        <a:xfrm>
+          <a:off x="0" y="0"/>
+          <a:ext cx="0" cy="0"/>
+          <a:chOff x="0" y="0"/>
+          <a:chExt cx="0" cy="0"/>
+        </a:xfrm>
+      </p:grpSpPr>
+      <p:pic>
+        <p:nvPicPr>
+          <p:cNvPr id="4" name="Picture 3">
+            <a:extLst>
+              <a:ext uri="{FF2B5EF4-FFF2-40B4-BE49-F238E27FC236}">
+                <a16:creationId xmlns:a16="http://schemas.microsoft.com/office/drawing/2014/main" id="{FAB3D2A6-579B-4316-8632-A685430C1B85}"/>
+              </a:ext>
+            </a:extLst>
+          </p:cNvPr>
+          <p:cNvPicPr>
+            <a:picLocks noChangeAspect="1"/>
+          </p:cNvPicPr>
+          <p:nvPr/>
+        </p:nvPicPr>
+        <p:blipFill>
+          <a:blip r:embed="rId3"/>
+          <a:stretch>
+            <a:fillRect/>
+          </a:stretch>
+        </p:blipFill>
+        <p:spPr>
+          <a:xfrm>
+            <a:off x="1524000" y="1828800"/>
+            <a:ext cx="6724650" cy="4114800"/>
+          </a:xfrm>
+          <a:prstGeom prst="rect">
+            <a:avLst/>
+          </a:prstGeom>
+        </p:spPr>
+      </p:pic>
+      <p:sp>
+        <p:nvSpPr>
+          <p:cNvPr id="5" name="Title 1">
+            <a:extLst>
+              <a:ext uri="{FF2B5EF4-FFF2-40B4-BE49-F238E27FC236}">
+                <a16:creationId xmlns:a16="http://schemas.microsoft.com/office/drawing/2014/main" id="{C26FA153-CC6D-4CCF-BC8F-986FDDA86C09}"/>
+              </a:ext>
+            </a:extLst>
+          </p:cNvPr>
+          <p:cNvSpPr>
+            <a:spLocks noGrp="1"/>
+          </p:cNvSpPr>
+          <p:nvPr>
+            <p:ph type="title"/>
+          </p:nvPr>
+        </p:nvSpPr>
+        <p:spPr>
+          <a:xfrm>
+            <a:off x="1524000" y="304800"/>
+            <a:ext cx="7498080" cy="1143000"/>
+          </a:xfrm>
+        </p:spPr>
+        <p:txBody>
+          <a:bodyPr/>
+          <a:lstStyle/>
+          <a:p>
+            <a:r>
+              <a:rPr lang="en-US" dirty="0"/>
+              <a:t>Thank you for your listening</a:t>
+            </a:r>
+          </a:p>
+        </p:txBody>
+      </p:sp>
+    </p:spTree>
+    <p:extLst>
+      <p:ext uri="{BB962C8B-B14F-4D97-AF65-F5344CB8AC3E}">
+        <p14:creationId xmlns:p14="http://schemas.microsoft.com/office/powerpoint/2010/main" val="3321134065"/>
       </p:ext>
     </p:extLst>
   </p:cSld>

</xml_diff>